<commit_message>
rename session and update session 3&4
</commit_message>
<xml_diff>
--- a/Hands-on.pptx
+++ b/Hands-on.pptx
@@ -14,6 +14,8 @@
     <p:sldId id="262" r:id="rId8"/>
     <p:sldId id="260" r:id="rId9"/>
     <p:sldId id="263" r:id="rId10"/>
+    <p:sldId id="264" r:id="rId11"/>
+    <p:sldId id="265" r:id="rId12"/>
   </p:sldIdLst>
   <p:sldSz cx="12192000" cy="6858000"/>
   <p:notesSz cx="6858000" cy="9144000"/>
@@ -3545,7 +3547,7 @@
           <a:p>
             <a:fld id="{69252BA8-370A-4E85-981D-AD17A11A109B}" type="datetimeFigureOut">
               <a:rPr lang="en-US" smtClean="0"/>
-              <a:t>11/16/2020</a:t>
+              <a:t>6/3/2021</a:t>
             </a:fld>
             <a:endParaRPr lang="en-US"/>
           </a:p>
@@ -14469,6 +14471,136 @@
 </p:sld>
 </file>
 
+<file path=ppt/slides/slide10.xml><?xml version="1.0" encoding="utf-8"?>
+<p:sld xmlns:a="http://schemas.openxmlformats.org/drawingml/2006/main" xmlns:r="http://schemas.openxmlformats.org/officeDocument/2006/relationships" xmlns:p="http://schemas.openxmlformats.org/presentationml/2006/main">
+  <p:cSld>
+    <p:spTree>
+      <p:nvGrpSpPr>
+        <p:cNvPr id="1" name=""/>
+        <p:cNvGrpSpPr/>
+        <p:nvPr/>
+      </p:nvGrpSpPr>
+      <p:grpSpPr>
+        <a:xfrm>
+          <a:off x="0" y="0"/>
+          <a:ext cx="0" cy="0"/>
+          <a:chOff x="0" y="0"/>
+          <a:chExt cx="0" cy="0"/>
+        </a:xfrm>
+      </p:grpSpPr>
+      <p:sp>
+        <p:nvSpPr>
+          <p:cNvPr id="2" name="标题 1">
+            <a:extLst>
+              <a:ext uri="{FF2B5EF4-FFF2-40B4-BE49-F238E27FC236}">
+                <a16:creationId xmlns:a16="http://schemas.microsoft.com/office/drawing/2014/main" id="{64913E05-91C1-4B3C-B7C3-1DE17C04E1DF}"/>
+              </a:ext>
+            </a:extLst>
+          </p:cNvPr>
+          <p:cNvSpPr>
+            <a:spLocks noGrp="1"/>
+          </p:cNvSpPr>
+          <p:nvPr>
+            <p:ph type="title"/>
+          </p:nvPr>
+        </p:nvSpPr>
+        <p:spPr/>
+        <p:txBody>
+          <a:bodyPr/>
+          <a:lstStyle/>
+          <a:p>
+            <a:r>
+              <a:rPr lang="en-US" altLang="zh-CN" dirty="0"/>
+              <a:t>Reference</a:t>
+            </a:r>
+            <a:endParaRPr lang="zh-CN" altLang="en-US" dirty="0"/>
+          </a:p>
+        </p:txBody>
+      </p:sp>
+      <p:sp>
+        <p:nvSpPr>
+          <p:cNvPr id="4" name="文本框 3">
+            <a:extLst>
+              <a:ext uri="{FF2B5EF4-FFF2-40B4-BE49-F238E27FC236}">
+                <a16:creationId xmlns:a16="http://schemas.microsoft.com/office/drawing/2014/main" id="{D0AFAD20-FEEC-4378-BEF1-72C19700CD83}"/>
+              </a:ext>
+            </a:extLst>
+          </p:cNvPr>
+          <p:cNvSpPr txBox="1"/>
+          <p:nvPr/>
+        </p:nvSpPr>
+        <p:spPr>
+          <a:xfrm>
+            <a:off x="588263" y="1363606"/>
+            <a:ext cx="10554470" cy="1450397"/>
+          </a:xfrm>
+          <a:prstGeom prst="rect">
+            <a:avLst/>
+          </a:prstGeom>
+          <a:noFill/>
+        </p:spPr>
+        <p:txBody>
+          <a:bodyPr wrap="square">
+            <a:spAutoFit/>
+          </a:bodyPr>
+          <a:lstStyle/>
+          <a:p>
+            <a:r>
+              <a:rPr lang="zh-CN" altLang="en-US" dirty="0">
+                <a:hlinkClick r:id="rId2"/>
+              </a:rPr>
+              <a:t>https://docs.microsoft.com/zh-cn/azure/digital-twins/overview</a:t>
+            </a:r>
+            <a:endParaRPr lang="en-US" altLang="zh-CN" dirty="0"/>
+          </a:p>
+          <a:p>
+            <a:r>
+              <a:rPr lang="en-US" altLang="zh-CN" dirty="0">
+                <a:hlinkClick r:id="rId3"/>
+              </a:rPr>
+              <a:t>https://docs.microsoft.com/zh-cn/azure/digital-twins/concepts-route-events</a:t>
+            </a:r>
+            <a:endParaRPr lang="en-US" altLang="zh-CN" dirty="0"/>
+          </a:p>
+          <a:p>
+            <a:r>
+              <a:rPr lang="en-US" altLang="zh-CN" dirty="0">
+                <a:hlinkClick r:id="rId4"/>
+              </a:rPr>
+              <a:t>https://docs.microsoft.com/zh-cn/azure/digital-twins/how-to-manage-model</a:t>
+            </a:r>
+            <a:endParaRPr lang="en-US" altLang="zh-CN" dirty="0"/>
+          </a:p>
+          <a:p>
+            <a:r>
+              <a:rPr lang="en-US" altLang="zh-CN" dirty="0">
+                <a:hlinkClick r:id="rId5"/>
+              </a:rPr>
+              <a:t>https://docs.microsoft.com/zh-cn/azure/digital-twins/how-to-integrate-time-series-insights</a:t>
+            </a:r>
+            <a:endParaRPr lang="en-US" altLang="zh-CN" dirty="0"/>
+          </a:p>
+          <a:p>
+            <a:endParaRPr lang="zh-CN" altLang="en-US" dirty="0"/>
+          </a:p>
+        </p:txBody>
+      </p:sp>
+    </p:spTree>
+    <p:extLst>
+      <p:ext uri="{BB962C8B-B14F-4D97-AF65-F5344CB8AC3E}">
+        <p14:creationId xmlns:p14="http://schemas.microsoft.com/office/powerpoint/2010/main" val="4011801758"/>
+      </p:ext>
+    </p:extLst>
+  </p:cSld>
+  <p:clrMapOvr>
+    <a:masterClrMapping/>
+  </p:clrMapOvr>
+  <p:transition>
+    <p:fade/>
+  </p:transition>
+</p:sld>
+</file>
+
 <file path=ppt/slides/slide2.xml><?xml version="1.0" encoding="utf-8"?>
 <p:sld xmlns:a="http://schemas.openxmlformats.org/drawingml/2006/main" xmlns:r="http://schemas.openxmlformats.org/officeDocument/2006/relationships" xmlns:p="http://schemas.openxmlformats.org/presentationml/2006/main">
   <p:cSld>
@@ -14758,8 +14890,12 @@
           <a:lstStyle/>
           <a:p>
             <a:r>
+              <a:rPr lang="en-US" altLang="zh-CN" dirty="0"/>
+              <a:t>Session</a:t>
+            </a:r>
+            <a:r>
               <a:rPr lang="en-US" dirty="0"/>
-              <a:t>Experiment #1</a:t>
+              <a:t> #1 – IoT Hub</a:t>
             </a:r>
           </a:p>
         </p:txBody>
@@ -16560,7 +16696,7 @@
           <a:p>
             <a:r>
               <a:rPr lang="en-US" dirty="0"/>
-              <a:t>Experiment #2</a:t>
+              <a:t>Session #2 – IoT Edge</a:t>
             </a:r>
           </a:p>
         </p:txBody>
@@ -17787,7 +17923,7 @@
           <a:p>
             <a:r>
               <a:rPr lang="en-US" dirty="0"/>
-              <a:t>Experiment #3 - optional</a:t>
+              <a:t>Session #3 – Azure Machine Learning</a:t>
             </a:r>
           </a:p>
         </p:txBody>
@@ -18010,10 +18146,10 @@
       </p:cxnSp>
       <p:pic>
         <p:nvPicPr>
-          <p:cNvPr id="12" name="Storage" descr="Storage">
+          <p:cNvPr id="16" name="Machine Learning Workbench" descr="Machine Learning Workbench">
             <a:extLst>
               <a:ext uri="{FF2B5EF4-FFF2-40B4-BE49-F238E27FC236}">
-                <a16:creationId xmlns:a16="http://schemas.microsoft.com/office/drawing/2014/main" id="{C3AB9788-CF8C-4BF0-BF26-F77D18B6A79B}"/>
+                <a16:creationId xmlns:a16="http://schemas.microsoft.com/office/drawing/2014/main" id="{6787A6CC-9415-48B6-8CE6-84157BFE7678}"/>
               </a:ext>
             </a:extLst>
           </p:cNvPr>
@@ -18030,90 +18166,6 @@
               </a:ext>
               <a:ext uri="{96DAC541-7B7A-43D3-8B79-37D633B846F1}">
                 <asvg:svgBlip xmlns:asvg="http://schemas.microsoft.com/office/drawing/2016/SVG/main" r:embed="rId4"/>
-              </a:ext>
-            </a:extLst>
-          </a:blip>
-          <a:stretch>
-            <a:fillRect/>
-          </a:stretch>
-        </p:blipFill>
-        <p:spPr>
-          <a:xfrm>
-            <a:off x="5102575" y="2131546"/>
-            <a:ext cx="457550" cy="457550"/>
-          </a:xfrm>
-          <a:prstGeom prst="rect">
-            <a:avLst/>
-          </a:prstGeom>
-        </p:spPr>
-      </p:pic>
-      <p:cxnSp>
-        <p:nvCxnSpPr>
-          <p:cNvPr id="14" name="直接箭头连接符 13">
-            <a:extLst>
-              <a:ext uri="{FF2B5EF4-FFF2-40B4-BE49-F238E27FC236}">
-                <a16:creationId xmlns:a16="http://schemas.microsoft.com/office/drawing/2014/main" id="{798590B5-8F32-4BA1-B95A-DE5A422EDCBB}"/>
-              </a:ext>
-            </a:extLst>
-          </p:cNvPr>
-          <p:cNvCxnSpPr>
-            <a:cxnSpLocks/>
-          </p:cNvCxnSpPr>
-          <p:nvPr/>
-        </p:nvCxnSpPr>
-        <p:spPr>
-          <a:xfrm>
-            <a:off x="4358006" y="2374373"/>
-            <a:ext cx="605961" cy="0"/>
-          </a:xfrm>
-          <a:prstGeom prst="straightConnector1">
-            <a:avLst/>
-          </a:prstGeom>
-          <a:ln w="38100">
-            <a:solidFill>
-              <a:schemeClr val="tx1"/>
-            </a:solidFill>
-            <a:headEnd type="none" w="lg" len="med"/>
-            <a:tailEnd type="triangle"/>
-          </a:ln>
-        </p:spPr>
-        <p:style>
-          <a:lnRef idx="1">
-            <a:schemeClr val="accent1"/>
-          </a:lnRef>
-          <a:fillRef idx="0">
-            <a:schemeClr val="accent1"/>
-          </a:fillRef>
-          <a:effectRef idx="0">
-            <a:schemeClr val="accent1"/>
-          </a:effectRef>
-          <a:fontRef idx="minor">
-            <a:schemeClr val="tx1"/>
-          </a:fontRef>
-        </p:style>
-      </p:cxnSp>
-      <p:pic>
-        <p:nvPicPr>
-          <p:cNvPr id="16" name="Machine Learning Workbench" descr="Machine Learning Workbench">
-            <a:extLst>
-              <a:ext uri="{FF2B5EF4-FFF2-40B4-BE49-F238E27FC236}">
-                <a16:creationId xmlns:a16="http://schemas.microsoft.com/office/drawing/2014/main" id="{6787A6CC-9415-48B6-8CE6-84157BFE7678}"/>
-              </a:ext>
-            </a:extLst>
-          </p:cNvPr>
-          <p:cNvPicPr>
-            <a:picLocks noChangeAspect="1"/>
-          </p:cNvPicPr>
-          <p:nvPr/>
-        </p:nvPicPr>
-        <p:blipFill>
-          <a:blip r:embed="rId5">
-            <a:extLst>
-              <a:ext uri="{28A0092B-C50C-407E-A947-70E740481C1C}">
-                <a14:useLocalDpi xmlns:a14="http://schemas.microsoft.com/office/drawing/2010/main" val="0"/>
-              </a:ext>
-              <a:ext uri="{96DAC541-7B7A-43D3-8B79-37D633B846F1}">
-                <asvg:svgBlip xmlns:asvg="http://schemas.microsoft.com/office/drawing/2016/SVG/main" r:embed="rId6"/>
               </a:ext>
             </a:extLst>
           </a:blip>
@@ -18146,7 +18198,7 @@
           <p:nvPr/>
         </p:nvPicPr>
         <p:blipFill>
-          <a:blip r:embed="rId7"/>
+          <a:blip r:embed="rId5"/>
           <a:stretch>
             <a:fillRect/>
           </a:stretch>
@@ -18176,7 +18228,7 @@
           <p:nvPr/>
         </p:nvPicPr>
         <p:blipFill>
-          <a:blip r:embed="rId8"/>
+          <a:blip r:embed="rId6"/>
           <a:stretch>
             <a:fillRect/>
           </a:stretch>
@@ -18191,67 +18243,6 @@
           </a:prstGeom>
         </p:spPr>
       </p:pic>
-      <p:sp>
-        <p:nvSpPr>
-          <p:cNvPr id="22" name="文本框 21">
-            <a:extLst>
-              <a:ext uri="{FF2B5EF4-FFF2-40B4-BE49-F238E27FC236}">
-                <a16:creationId xmlns:a16="http://schemas.microsoft.com/office/drawing/2014/main" id="{2ABB6556-6AC0-4988-B931-898772212DC7}"/>
-              </a:ext>
-            </a:extLst>
-          </p:cNvPr>
-          <p:cNvSpPr txBox="1"/>
-          <p:nvPr/>
-        </p:nvSpPr>
-        <p:spPr>
-          <a:xfrm>
-            <a:off x="4990404" y="2733201"/>
-            <a:ext cx="693908" cy="246221"/>
-          </a:xfrm>
-          <a:prstGeom prst="rect">
-            <a:avLst/>
-          </a:prstGeom>
-          <a:noFill/>
-        </p:spPr>
-        <p:txBody>
-          <a:bodyPr wrap="none" lIns="0" tIns="0" rIns="0" bIns="0" rtlCol="0">
-            <a:spAutoFit/>
-          </a:bodyPr>
-          <a:lstStyle/>
-          <a:p>
-            <a:pPr algn="l"/>
-            <a:r>
-              <a:rPr lang="en-US" altLang="zh-CN" sz="1600" dirty="0">
-                <a:gradFill>
-                  <a:gsLst>
-                    <a:gs pos="2917">
-                      <a:schemeClr val="tx1"/>
-                    </a:gs>
-                    <a:gs pos="30000">
-                      <a:schemeClr val="tx1"/>
-                    </a:gs>
-                  </a:gsLst>
-                  <a:lin ang="5400000" scaled="0"/>
-                </a:gradFill>
-              </a:rPr>
-              <a:t>Storage</a:t>
-            </a:r>
-            <a:endParaRPr lang="en-US" sz="1600" dirty="0">
-              <a:gradFill>
-                <a:gsLst>
-                  <a:gs pos="2917">
-                    <a:schemeClr val="tx1"/>
-                  </a:gs>
-                  <a:gs pos="30000">
-                    <a:schemeClr val="tx1"/>
-                  </a:gs>
-                </a:gsLst>
-                <a:lin ang="5400000" scaled="0"/>
-              </a:gradFill>
-            </a:endParaRPr>
-          </a:p>
-        </p:txBody>
-      </p:sp>
       <p:sp>
         <p:nvSpPr>
           <p:cNvPr id="24" name="文本框 23">
@@ -18492,51 +18483,6 @@
           </a:p>
         </p:txBody>
       </p:sp>
-      <p:cxnSp>
-        <p:nvCxnSpPr>
-          <p:cNvPr id="30" name="直接箭头连接符 29">
-            <a:extLst>
-              <a:ext uri="{FF2B5EF4-FFF2-40B4-BE49-F238E27FC236}">
-                <a16:creationId xmlns:a16="http://schemas.microsoft.com/office/drawing/2014/main" id="{9FFA17E3-59DC-42D0-BCD2-85AF11BDD6C7}"/>
-              </a:ext>
-            </a:extLst>
-          </p:cNvPr>
-          <p:cNvCxnSpPr>
-            <a:cxnSpLocks/>
-          </p:cNvCxnSpPr>
-          <p:nvPr/>
-        </p:nvCxnSpPr>
-        <p:spPr>
-          <a:xfrm>
-            <a:off x="5749542" y="2374373"/>
-            <a:ext cx="605961" cy="0"/>
-          </a:xfrm>
-          <a:prstGeom prst="straightConnector1">
-            <a:avLst/>
-          </a:prstGeom>
-          <a:ln w="38100">
-            <a:solidFill>
-              <a:schemeClr val="tx1"/>
-            </a:solidFill>
-            <a:headEnd type="none" w="lg" len="med"/>
-            <a:tailEnd type="triangle"/>
-          </a:ln>
-        </p:spPr>
-        <p:style>
-          <a:lnRef idx="1">
-            <a:schemeClr val="accent1"/>
-          </a:lnRef>
-          <a:fillRef idx="0">
-            <a:schemeClr val="accent1"/>
-          </a:fillRef>
-          <a:effectRef idx="0">
-            <a:schemeClr val="accent1"/>
-          </a:effectRef>
-          <a:fontRef idx="minor">
-            <a:schemeClr val="tx1"/>
-          </a:fontRef>
-        </p:style>
-      </p:cxnSp>
       <p:cxnSp>
         <p:nvCxnSpPr>
           <p:cNvPr id="32" name="直接箭头连接符 31">
@@ -18806,6 +18752,1808 @@
     <p:extLst>
       <p:ext uri="{BB962C8B-B14F-4D97-AF65-F5344CB8AC3E}">
         <p14:creationId xmlns:p14="http://schemas.microsoft.com/office/powerpoint/2010/main" val="509820831"/>
+      </p:ext>
+    </p:extLst>
+  </p:cSld>
+  <p:clrMapOvr>
+    <a:masterClrMapping/>
+  </p:clrMapOvr>
+  <p:transition>
+    <p:fade/>
+  </p:transition>
+</p:sld>
+</file>
+
+<file path=ppt/slides/slide9.xml><?xml version="1.0" encoding="utf-8"?>
+<p:sld xmlns:a="http://schemas.openxmlformats.org/drawingml/2006/main" xmlns:r="http://schemas.openxmlformats.org/officeDocument/2006/relationships" xmlns:p="http://schemas.openxmlformats.org/presentationml/2006/main">
+  <p:cSld>
+    <p:spTree>
+      <p:nvGrpSpPr>
+        <p:cNvPr id="1" name=""/>
+        <p:cNvGrpSpPr/>
+        <p:nvPr/>
+      </p:nvGrpSpPr>
+      <p:grpSpPr>
+        <a:xfrm>
+          <a:off x="0" y="0"/>
+          <a:ext cx="0" cy="0"/>
+          <a:chOff x="0" y="0"/>
+          <a:chExt cx="0" cy="0"/>
+        </a:xfrm>
+      </p:grpSpPr>
+      <p:sp>
+        <p:nvSpPr>
+          <p:cNvPr id="2" name="标题 1">
+            <a:extLst>
+              <a:ext uri="{FF2B5EF4-FFF2-40B4-BE49-F238E27FC236}">
+                <a16:creationId xmlns:a16="http://schemas.microsoft.com/office/drawing/2014/main" id="{3BD571D3-BF8C-49F5-A4E3-E2C83FA83806}"/>
+              </a:ext>
+            </a:extLst>
+          </p:cNvPr>
+          <p:cNvSpPr>
+            <a:spLocks noGrp="1"/>
+          </p:cNvSpPr>
+          <p:nvPr>
+            <p:ph type="title"/>
+          </p:nvPr>
+        </p:nvSpPr>
+        <p:spPr/>
+        <p:txBody>
+          <a:bodyPr/>
+          <a:lstStyle/>
+          <a:p>
+            <a:r>
+              <a:rPr lang="en-US" altLang="zh-CN" dirty="0"/>
+              <a:t>Session #4 – Azure Digital Twin</a:t>
+            </a:r>
+            <a:endParaRPr lang="zh-CN" altLang="en-US" dirty="0"/>
+          </a:p>
+        </p:txBody>
+      </p:sp>
+      <p:pic>
+        <p:nvPicPr>
+          <p:cNvPr id="4" name="Graphic 1">
+            <a:extLst>
+              <a:ext uri="{FF2B5EF4-FFF2-40B4-BE49-F238E27FC236}">
+                <a16:creationId xmlns:a16="http://schemas.microsoft.com/office/drawing/2014/main" id="{8D112D88-5F5F-410F-9A8C-B5F4B1E35A56}"/>
+              </a:ext>
+            </a:extLst>
+          </p:cNvPr>
+          <p:cNvPicPr>
+            <a:picLocks noChangeAspect="1"/>
+          </p:cNvPicPr>
+          <p:nvPr/>
+        </p:nvPicPr>
+        <p:blipFill>
+          <a:blip r:embed="rId2">
+            <a:extLst>
+              <a:ext uri="{96DAC541-7B7A-43D3-8B79-37D633B846F1}">
+                <asvg:svgBlip xmlns:asvg="http://schemas.microsoft.com/office/drawing/2016/SVG/main" r:embed="rId3"/>
+              </a:ext>
+            </a:extLst>
+          </a:blip>
+          <a:stretch>
+            <a:fillRect/>
+          </a:stretch>
+        </p:blipFill>
+        <p:spPr>
+          <a:xfrm>
+            <a:off x="5480011" y="2688074"/>
+            <a:ext cx="1002714" cy="1002714"/>
+          </a:xfrm>
+          <a:prstGeom prst="rect">
+            <a:avLst/>
+          </a:prstGeom>
+        </p:spPr>
+      </p:pic>
+      <p:pic>
+        <p:nvPicPr>
+          <p:cNvPr id="6" name="Event Hubs" descr="Event Hubs">
+            <a:extLst>
+              <a:ext uri="{FF2B5EF4-FFF2-40B4-BE49-F238E27FC236}">
+                <a16:creationId xmlns:a16="http://schemas.microsoft.com/office/drawing/2014/main" id="{1C898679-FA88-4E45-A109-7928817394DC}"/>
+              </a:ext>
+            </a:extLst>
+          </p:cNvPr>
+          <p:cNvPicPr>
+            <a:picLocks noChangeAspect="1"/>
+          </p:cNvPicPr>
+          <p:nvPr/>
+        </p:nvPicPr>
+        <p:blipFill>
+          <a:blip r:embed="rId4"/>
+          <a:stretch>
+            <a:fillRect/>
+          </a:stretch>
+        </p:blipFill>
+        <p:spPr>
+          <a:xfrm>
+            <a:off x="7445110" y="2948692"/>
+            <a:ext cx="467828" cy="492622"/>
+          </a:xfrm>
+          <a:prstGeom prst="rect">
+            <a:avLst/>
+          </a:prstGeom>
+        </p:spPr>
+      </p:pic>
+      <p:pic>
+        <p:nvPicPr>
+          <p:cNvPr id="8" name="Functions" descr="Functions">
+            <a:extLst>
+              <a:ext uri="{FF2B5EF4-FFF2-40B4-BE49-F238E27FC236}">
+                <a16:creationId xmlns:a16="http://schemas.microsoft.com/office/drawing/2014/main" id="{26437C7D-F403-4FB6-AD26-D5AACA166FF8}"/>
+              </a:ext>
+            </a:extLst>
+          </p:cNvPr>
+          <p:cNvPicPr>
+            <a:picLocks noChangeAspect="1"/>
+          </p:cNvPicPr>
+          <p:nvPr/>
+        </p:nvPicPr>
+        <p:blipFill>
+          <a:blip r:embed="rId5"/>
+          <a:stretch>
+            <a:fillRect/>
+          </a:stretch>
+        </p:blipFill>
+        <p:spPr>
+          <a:xfrm>
+            <a:off x="7964646" y="1553952"/>
+            <a:ext cx="459621" cy="418729"/>
+          </a:xfrm>
+          <a:prstGeom prst="rect">
+            <a:avLst/>
+          </a:prstGeom>
+        </p:spPr>
+      </p:pic>
+      <p:pic>
+        <p:nvPicPr>
+          <p:cNvPr id="10" name="IoT Hub" descr="IoT Hub">
+            <a:extLst>
+              <a:ext uri="{FF2B5EF4-FFF2-40B4-BE49-F238E27FC236}">
+                <a16:creationId xmlns:a16="http://schemas.microsoft.com/office/drawing/2014/main" id="{22F6658A-60BB-42D0-AC04-84C69F718200}"/>
+              </a:ext>
+            </a:extLst>
+          </p:cNvPr>
+          <p:cNvPicPr>
+            <a:picLocks noChangeAspect="1"/>
+          </p:cNvPicPr>
+          <p:nvPr/>
+        </p:nvPicPr>
+        <p:blipFill>
+          <a:blip r:embed="rId6"/>
+          <a:stretch>
+            <a:fillRect/>
+          </a:stretch>
+        </p:blipFill>
+        <p:spPr>
+          <a:xfrm>
+            <a:off x="2489883" y="2961009"/>
+            <a:ext cx="467828" cy="467991"/>
+          </a:xfrm>
+          <a:prstGeom prst="rect">
+            <a:avLst/>
+          </a:prstGeom>
+        </p:spPr>
+      </p:pic>
+      <p:sp>
+        <p:nvSpPr>
+          <p:cNvPr id="12" name="文本框 11">
+            <a:extLst>
+              <a:ext uri="{FF2B5EF4-FFF2-40B4-BE49-F238E27FC236}">
+                <a16:creationId xmlns:a16="http://schemas.microsoft.com/office/drawing/2014/main" id="{3AA6CB30-5FF9-436B-8D5E-BF2DC0B081A8}"/>
+              </a:ext>
+            </a:extLst>
+          </p:cNvPr>
+          <p:cNvSpPr txBox="1"/>
+          <p:nvPr/>
+        </p:nvSpPr>
+        <p:spPr>
+          <a:xfrm>
+            <a:off x="2400667" y="3544955"/>
+            <a:ext cx="719749" cy="246221"/>
+          </a:xfrm>
+          <a:prstGeom prst="rect">
+            <a:avLst/>
+          </a:prstGeom>
+          <a:noFill/>
+        </p:spPr>
+        <p:txBody>
+          <a:bodyPr wrap="none" lIns="0" tIns="0" rIns="0" bIns="0" rtlCol="0">
+            <a:spAutoFit/>
+          </a:bodyPr>
+          <a:lstStyle/>
+          <a:p>
+            <a:pPr algn="l"/>
+            <a:r>
+              <a:rPr lang="en-US" altLang="zh-CN" sz="1600" dirty="0">
+                <a:gradFill>
+                  <a:gsLst>
+                    <a:gs pos="2917">
+                      <a:schemeClr val="tx1"/>
+                    </a:gs>
+                    <a:gs pos="30000">
+                      <a:schemeClr val="tx1"/>
+                    </a:gs>
+                  </a:gsLst>
+                  <a:lin ang="5400000" scaled="0"/>
+                </a:gradFill>
+              </a:rPr>
+              <a:t>IoT Hub</a:t>
+            </a:r>
+            <a:endParaRPr lang="en-US" sz="1600" dirty="0">
+              <a:gradFill>
+                <a:gsLst>
+                  <a:gs pos="2917">
+                    <a:schemeClr val="tx1"/>
+                  </a:gs>
+                  <a:gs pos="30000">
+                    <a:schemeClr val="tx1"/>
+                  </a:gs>
+                </a:gsLst>
+                <a:lin ang="5400000" scaled="0"/>
+              </a:gradFill>
+            </a:endParaRPr>
+          </a:p>
+        </p:txBody>
+      </p:sp>
+      <p:sp>
+        <p:nvSpPr>
+          <p:cNvPr id="14" name="文本框 13">
+            <a:extLst>
+              <a:ext uri="{FF2B5EF4-FFF2-40B4-BE49-F238E27FC236}">
+                <a16:creationId xmlns:a16="http://schemas.microsoft.com/office/drawing/2014/main" id="{AD929B40-B32F-475C-B5C4-CBD9D1A1A0C4}"/>
+              </a:ext>
+            </a:extLst>
+          </p:cNvPr>
+          <p:cNvSpPr txBox="1"/>
+          <p:nvPr/>
+        </p:nvSpPr>
+        <p:spPr>
+          <a:xfrm>
+            <a:off x="489177" y="2878350"/>
+            <a:ext cx="1128129" cy="615553"/>
+          </a:xfrm>
+          <a:prstGeom prst="rect">
+            <a:avLst/>
+          </a:prstGeom>
+          <a:noFill/>
+        </p:spPr>
+        <p:txBody>
+          <a:bodyPr wrap="none" lIns="0" tIns="0" rIns="0" bIns="0" rtlCol="0">
+            <a:spAutoFit/>
+          </a:bodyPr>
+          <a:lstStyle/>
+          <a:p>
+            <a:pPr algn="ctr"/>
+            <a:r>
+              <a:rPr lang="en-US" sz="2000" dirty="0">
+                <a:gradFill>
+                  <a:gsLst>
+                    <a:gs pos="2917">
+                      <a:schemeClr val="tx1"/>
+                    </a:gs>
+                    <a:gs pos="30000">
+                      <a:schemeClr val="tx1"/>
+                    </a:gs>
+                  </a:gsLst>
+                  <a:lin ang="5400000" scaled="0"/>
+                </a:gradFill>
+              </a:rPr>
+              <a:t>Simulated</a:t>
+            </a:r>
+          </a:p>
+          <a:p>
+            <a:pPr algn="ctr"/>
+            <a:r>
+              <a:rPr lang="en-US" altLang="zh-CN" sz="2000" dirty="0">
+                <a:gradFill>
+                  <a:gsLst>
+                    <a:gs pos="2917">
+                      <a:schemeClr val="tx1"/>
+                    </a:gs>
+                    <a:gs pos="30000">
+                      <a:schemeClr val="tx1"/>
+                    </a:gs>
+                  </a:gsLst>
+                  <a:lin ang="5400000" scaled="0"/>
+                </a:gradFill>
+              </a:rPr>
+              <a:t>Device</a:t>
+            </a:r>
+            <a:endParaRPr lang="en-US" sz="2000" dirty="0">
+              <a:gradFill>
+                <a:gsLst>
+                  <a:gs pos="2917">
+                    <a:schemeClr val="tx1"/>
+                  </a:gs>
+                  <a:gs pos="30000">
+                    <a:schemeClr val="tx1"/>
+                  </a:gs>
+                </a:gsLst>
+                <a:lin ang="5400000" scaled="0"/>
+              </a:gradFill>
+            </a:endParaRPr>
+          </a:p>
+        </p:txBody>
+      </p:sp>
+      <p:cxnSp>
+        <p:nvCxnSpPr>
+          <p:cNvPr id="16" name="直接箭头连接符 15">
+            <a:extLst>
+              <a:ext uri="{FF2B5EF4-FFF2-40B4-BE49-F238E27FC236}">
+                <a16:creationId xmlns:a16="http://schemas.microsoft.com/office/drawing/2014/main" id="{16AC71C8-33EC-41CA-B713-62DE684989A2}"/>
+              </a:ext>
+            </a:extLst>
+          </p:cNvPr>
+          <p:cNvCxnSpPr>
+            <a:cxnSpLocks/>
+          </p:cNvCxnSpPr>
+          <p:nvPr/>
+        </p:nvCxnSpPr>
+        <p:spPr>
+          <a:xfrm>
+            <a:off x="1715565" y="3172074"/>
+            <a:ext cx="605961" cy="0"/>
+          </a:xfrm>
+          <a:prstGeom prst="straightConnector1">
+            <a:avLst/>
+          </a:prstGeom>
+          <a:ln w="38100">
+            <a:solidFill>
+              <a:schemeClr val="tx1"/>
+            </a:solidFill>
+            <a:headEnd type="none" w="lg" len="med"/>
+            <a:tailEnd type="triangle"/>
+          </a:ln>
+        </p:spPr>
+        <p:style>
+          <a:lnRef idx="1">
+            <a:schemeClr val="accent1"/>
+          </a:lnRef>
+          <a:fillRef idx="0">
+            <a:schemeClr val="accent1"/>
+          </a:fillRef>
+          <a:effectRef idx="0">
+            <a:schemeClr val="accent1"/>
+          </a:effectRef>
+          <a:fontRef idx="minor">
+            <a:schemeClr val="tx1"/>
+          </a:fontRef>
+        </p:style>
+      </p:cxnSp>
+      <p:cxnSp>
+        <p:nvCxnSpPr>
+          <p:cNvPr id="18" name="直接箭头连接符 17">
+            <a:extLst>
+              <a:ext uri="{FF2B5EF4-FFF2-40B4-BE49-F238E27FC236}">
+                <a16:creationId xmlns:a16="http://schemas.microsoft.com/office/drawing/2014/main" id="{5CA9FFC8-4039-4640-A054-CED4106E1D0F}"/>
+              </a:ext>
+            </a:extLst>
+          </p:cNvPr>
+          <p:cNvCxnSpPr>
+            <a:cxnSpLocks/>
+          </p:cNvCxnSpPr>
+          <p:nvPr/>
+        </p:nvCxnSpPr>
+        <p:spPr>
+          <a:xfrm>
+            <a:off x="3178875" y="3186906"/>
+            <a:ext cx="605961" cy="0"/>
+          </a:xfrm>
+          <a:prstGeom prst="straightConnector1">
+            <a:avLst/>
+          </a:prstGeom>
+          <a:ln w="38100">
+            <a:solidFill>
+              <a:schemeClr val="tx1"/>
+            </a:solidFill>
+            <a:headEnd type="none" w="lg" len="med"/>
+            <a:tailEnd type="triangle"/>
+          </a:ln>
+        </p:spPr>
+        <p:style>
+          <a:lnRef idx="1">
+            <a:schemeClr val="accent1"/>
+          </a:lnRef>
+          <a:fillRef idx="0">
+            <a:schemeClr val="accent1"/>
+          </a:fillRef>
+          <a:effectRef idx="0">
+            <a:schemeClr val="accent1"/>
+          </a:effectRef>
+          <a:fontRef idx="minor">
+            <a:schemeClr val="tx1"/>
+          </a:fontRef>
+        </p:style>
+      </p:cxnSp>
+      <p:pic>
+        <p:nvPicPr>
+          <p:cNvPr id="20" name="Functions" descr="Functions">
+            <a:extLst>
+              <a:ext uri="{FF2B5EF4-FFF2-40B4-BE49-F238E27FC236}">
+                <a16:creationId xmlns:a16="http://schemas.microsoft.com/office/drawing/2014/main" id="{6BE3E708-AC69-43BB-BB7A-D6AA057DBFA8}"/>
+              </a:ext>
+            </a:extLst>
+          </p:cNvPr>
+          <p:cNvPicPr>
+            <a:picLocks noChangeAspect="1"/>
+          </p:cNvPicPr>
+          <p:nvPr/>
+        </p:nvPicPr>
+        <p:blipFill>
+          <a:blip r:embed="rId5"/>
+          <a:stretch>
+            <a:fillRect/>
+          </a:stretch>
+        </p:blipFill>
+        <p:spPr>
+          <a:xfrm>
+            <a:off x="4071586" y="2985639"/>
+            <a:ext cx="459621" cy="418729"/>
+          </a:xfrm>
+          <a:prstGeom prst="rect">
+            <a:avLst/>
+          </a:prstGeom>
+        </p:spPr>
+      </p:pic>
+      <p:sp>
+        <p:nvSpPr>
+          <p:cNvPr id="21" name="文本框 20">
+            <a:extLst>
+              <a:ext uri="{FF2B5EF4-FFF2-40B4-BE49-F238E27FC236}">
+                <a16:creationId xmlns:a16="http://schemas.microsoft.com/office/drawing/2014/main" id="{FFAF771E-C2E6-4EBE-91AF-80567A4F12B0}"/>
+              </a:ext>
+            </a:extLst>
+          </p:cNvPr>
+          <p:cNvSpPr txBox="1"/>
+          <p:nvPr/>
+        </p:nvSpPr>
+        <p:spPr>
+          <a:xfrm>
+            <a:off x="5450340" y="3875174"/>
+            <a:ext cx="1053045" cy="246221"/>
+          </a:xfrm>
+          <a:prstGeom prst="rect">
+            <a:avLst/>
+          </a:prstGeom>
+          <a:noFill/>
+        </p:spPr>
+        <p:txBody>
+          <a:bodyPr wrap="none" lIns="0" tIns="0" rIns="0" bIns="0" rtlCol="0">
+            <a:spAutoFit/>
+          </a:bodyPr>
+          <a:lstStyle/>
+          <a:p>
+            <a:pPr algn="l"/>
+            <a:r>
+              <a:rPr lang="en-US" altLang="zh-CN" sz="1600" dirty="0">
+                <a:gradFill>
+                  <a:gsLst>
+                    <a:gs pos="2917">
+                      <a:schemeClr val="tx1"/>
+                    </a:gs>
+                    <a:gs pos="30000">
+                      <a:schemeClr val="tx1"/>
+                    </a:gs>
+                  </a:gsLst>
+                  <a:lin ang="5400000" scaled="0"/>
+                </a:gradFill>
+              </a:rPr>
+              <a:t>Digital Twin</a:t>
+            </a:r>
+            <a:endParaRPr lang="en-US" sz="1600" dirty="0">
+              <a:gradFill>
+                <a:gsLst>
+                  <a:gs pos="2917">
+                    <a:schemeClr val="tx1"/>
+                  </a:gs>
+                  <a:gs pos="30000">
+                    <a:schemeClr val="tx1"/>
+                  </a:gs>
+                </a:gsLst>
+                <a:lin ang="5400000" scaled="0"/>
+              </a:gradFill>
+            </a:endParaRPr>
+          </a:p>
+        </p:txBody>
+      </p:sp>
+      <p:sp>
+        <p:nvSpPr>
+          <p:cNvPr id="23" name="文本框 22">
+            <a:extLst>
+              <a:ext uri="{FF2B5EF4-FFF2-40B4-BE49-F238E27FC236}">
+                <a16:creationId xmlns:a16="http://schemas.microsoft.com/office/drawing/2014/main" id="{86F53360-E652-4804-953E-DC2911F9E6BF}"/>
+              </a:ext>
+            </a:extLst>
+          </p:cNvPr>
+          <p:cNvSpPr txBox="1"/>
+          <p:nvPr/>
+        </p:nvSpPr>
+        <p:spPr>
+          <a:xfrm>
+            <a:off x="3941521" y="3543401"/>
+            <a:ext cx="970202" cy="738664"/>
+          </a:xfrm>
+          <a:prstGeom prst="rect">
+            <a:avLst/>
+          </a:prstGeom>
+          <a:noFill/>
+        </p:spPr>
+        <p:txBody>
+          <a:bodyPr wrap="none" lIns="0" tIns="0" rIns="0" bIns="0" rtlCol="0">
+            <a:spAutoFit/>
+          </a:bodyPr>
+          <a:lstStyle/>
+          <a:p>
+            <a:pPr algn="l"/>
+            <a:r>
+              <a:rPr lang="en-US" sz="1600" dirty="0">
+                <a:gradFill>
+                  <a:gsLst>
+                    <a:gs pos="2917">
+                      <a:schemeClr val="tx1"/>
+                    </a:gs>
+                    <a:gs pos="30000">
+                      <a:schemeClr val="tx1"/>
+                    </a:gs>
+                  </a:gsLst>
+                  <a:lin ang="5400000" scaled="0"/>
+                </a:gradFill>
+              </a:rPr>
+              <a:t>Function</a:t>
+            </a:r>
+          </a:p>
+          <a:p>
+            <a:pPr algn="l"/>
+            <a:endParaRPr lang="en-US" sz="1600" dirty="0">
+              <a:gradFill>
+                <a:gsLst>
+                  <a:gs pos="2917">
+                    <a:schemeClr val="tx1"/>
+                  </a:gs>
+                  <a:gs pos="30000">
+                    <a:schemeClr val="tx1"/>
+                  </a:gs>
+                </a:gsLst>
+                <a:lin ang="5400000" scaled="0"/>
+              </a:gradFill>
+            </a:endParaRPr>
+          </a:p>
+          <a:p>
+            <a:pPr algn="l"/>
+            <a:r>
+              <a:rPr lang="en-US" sz="1600" dirty="0">
+                <a:gradFill>
+                  <a:gsLst>
+                    <a:gs pos="2917">
+                      <a:schemeClr val="tx1"/>
+                    </a:gs>
+                    <a:gs pos="30000">
+                      <a:schemeClr val="tx1"/>
+                    </a:gs>
+                  </a:gsLst>
+                  <a:lin ang="5400000" scaled="0"/>
+                </a:gradFill>
+              </a:rPr>
+              <a:t>IoT </a:t>
+            </a:r>
+            <a:r>
+              <a:rPr lang="en-US" sz="1600" dirty="0">
+                <a:gradFill>
+                  <a:gsLst>
+                    <a:gs pos="2917">
+                      <a:schemeClr val="tx1"/>
+                    </a:gs>
+                    <a:gs pos="30000">
+                      <a:schemeClr val="tx1"/>
+                    </a:gs>
+                  </a:gsLst>
+                  <a:lin ang="5400000" scaled="0"/>
+                </a:gradFill>
+                <a:sym typeface="Wingdings" panose="05000000000000000000" pitchFamily="2" charset="2"/>
+              </a:rPr>
+              <a:t> ADT</a:t>
+            </a:r>
+            <a:endParaRPr lang="en-US" sz="1600" dirty="0">
+              <a:gradFill>
+                <a:gsLst>
+                  <a:gs pos="2917">
+                    <a:schemeClr val="tx1"/>
+                  </a:gs>
+                  <a:gs pos="30000">
+                    <a:schemeClr val="tx1"/>
+                  </a:gs>
+                </a:gsLst>
+                <a:lin ang="5400000" scaled="0"/>
+              </a:gradFill>
+            </a:endParaRPr>
+          </a:p>
+        </p:txBody>
+      </p:sp>
+      <p:cxnSp>
+        <p:nvCxnSpPr>
+          <p:cNvPr id="25" name="直接箭头连接符 24">
+            <a:extLst>
+              <a:ext uri="{FF2B5EF4-FFF2-40B4-BE49-F238E27FC236}">
+                <a16:creationId xmlns:a16="http://schemas.microsoft.com/office/drawing/2014/main" id="{850A4ECF-7976-401F-AE27-B8D91EFD4D9D}"/>
+              </a:ext>
+            </a:extLst>
+          </p:cNvPr>
+          <p:cNvCxnSpPr>
+            <a:cxnSpLocks/>
+          </p:cNvCxnSpPr>
+          <p:nvPr/>
+        </p:nvCxnSpPr>
+        <p:spPr>
+          <a:xfrm>
+            <a:off x="6695585" y="3172074"/>
+            <a:ext cx="605961" cy="0"/>
+          </a:xfrm>
+          <a:prstGeom prst="straightConnector1">
+            <a:avLst/>
+          </a:prstGeom>
+          <a:ln w="38100">
+            <a:solidFill>
+              <a:schemeClr val="tx1"/>
+            </a:solidFill>
+            <a:headEnd type="none" w="lg" len="med"/>
+            <a:tailEnd type="triangle"/>
+          </a:ln>
+        </p:spPr>
+        <p:style>
+          <a:lnRef idx="1">
+            <a:schemeClr val="accent1"/>
+          </a:lnRef>
+          <a:fillRef idx="0">
+            <a:schemeClr val="accent1"/>
+          </a:fillRef>
+          <a:effectRef idx="0">
+            <a:schemeClr val="accent1"/>
+          </a:effectRef>
+          <a:fontRef idx="minor">
+            <a:schemeClr val="tx1"/>
+          </a:fontRef>
+        </p:style>
+      </p:cxnSp>
+      <p:cxnSp>
+        <p:nvCxnSpPr>
+          <p:cNvPr id="27" name="直接箭头连接符 26">
+            <a:extLst>
+              <a:ext uri="{FF2B5EF4-FFF2-40B4-BE49-F238E27FC236}">
+                <a16:creationId xmlns:a16="http://schemas.microsoft.com/office/drawing/2014/main" id="{B8498BC5-4D9C-471D-945F-3953F441B39F}"/>
+              </a:ext>
+            </a:extLst>
+          </p:cNvPr>
+          <p:cNvCxnSpPr>
+            <a:cxnSpLocks/>
+          </p:cNvCxnSpPr>
+          <p:nvPr/>
+        </p:nvCxnSpPr>
+        <p:spPr>
+          <a:xfrm>
+            <a:off x="4722184" y="3172074"/>
+            <a:ext cx="605961" cy="0"/>
+          </a:xfrm>
+          <a:prstGeom prst="straightConnector1">
+            <a:avLst/>
+          </a:prstGeom>
+          <a:ln w="38100">
+            <a:solidFill>
+              <a:schemeClr val="tx1"/>
+            </a:solidFill>
+            <a:headEnd type="none" w="lg" len="med"/>
+            <a:tailEnd type="triangle"/>
+          </a:ln>
+        </p:spPr>
+        <p:style>
+          <a:lnRef idx="1">
+            <a:schemeClr val="accent1"/>
+          </a:lnRef>
+          <a:fillRef idx="0">
+            <a:schemeClr val="accent1"/>
+          </a:fillRef>
+          <a:effectRef idx="0">
+            <a:schemeClr val="accent1"/>
+          </a:effectRef>
+          <a:fontRef idx="minor">
+            <a:schemeClr val="tx1"/>
+          </a:fontRef>
+        </p:style>
+      </p:cxnSp>
+      <p:sp>
+        <p:nvSpPr>
+          <p:cNvPr id="29" name="文本框 28">
+            <a:extLst>
+              <a:ext uri="{FF2B5EF4-FFF2-40B4-BE49-F238E27FC236}">
+                <a16:creationId xmlns:a16="http://schemas.microsoft.com/office/drawing/2014/main" id="{33A30DD6-6E27-466A-84E1-C86B329251E3}"/>
+              </a:ext>
+            </a:extLst>
+          </p:cNvPr>
+          <p:cNvSpPr txBox="1"/>
+          <p:nvPr/>
+        </p:nvSpPr>
+        <p:spPr>
+          <a:xfrm>
+            <a:off x="7240552" y="3543400"/>
+            <a:ext cx="930126" cy="492443"/>
+          </a:xfrm>
+          <a:prstGeom prst="rect">
+            <a:avLst/>
+          </a:prstGeom>
+          <a:noFill/>
+        </p:spPr>
+        <p:txBody>
+          <a:bodyPr wrap="none" lIns="0" tIns="0" rIns="0" bIns="0" rtlCol="0">
+            <a:spAutoFit/>
+          </a:bodyPr>
+          <a:lstStyle/>
+          <a:p>
+            <a:pPr algn="l"/>
+            <a:r>
+              <a:rPr lang="en-US" sz="1600" dirty="0">
+                <a:gradFill>
+                  <a:gsLst>
+                    <a:gs pos="2917">
+                      <a:schemeClr val="tx1"/>
+                    </a:gs>
+                    <a:gs pos="30000">
+                      <a:schemeClr val="tx1"/>
+                    </a:gs>
+                  </a:gsLst>
+                  <a:lin ang="5400000" scaled="0"/>
+                </a:gradFill>
+              </a:rPr>
+              <a:t>Event Hub</a:t>
+            </a:r>
+          </a:p>
+          <a:p>
+            <a:pPr algn="l"/>
+            <a:endParaRPr lang="en-US" sz="1600" dirty="0">
+              <a:gradFill>
+                <a:gsLst>
+                  <a:gs pos="2917">
+                    <a:schemeClr val="tx1"/>
+                  </a:gs>
+                  <a:gs pos="30000">
+                    <a:schemeClr val="tx1"/>
+                  </a:gs>
+                </a:gsLst>
+                <a:lin ang="5400000" scaled="0"/>
+              </a:gradFill>
+            </a:endParaRPr>
+          </a:p>
+        </p:txBody>
+      </p:sp>
+      <p:pic>
+        <p:nvPicPr>
+          <p:cNvPr id="31" name="Functions" descr="Functions">
+            <a:extLst>
+              <a:ext uri="{FF2B5EF4-FFF2-40B4-BE49-F238E27FC236}">
+                <a16:creationId xmlns:a16="http://schemas.microsoft.com/office/drawing/2014/main" id="{FFE114E5-F133-49DE-ADBC-82B696A82632}"/>
+              </a:ext>
+            </a:extLst>
+          </p:cNvPr>
+          <p:cNvPicPr>
+            <a:picLocks noChangeAspect="1"/>
+          </p:cNvPicPr>
+          <p:nvPr/>
+        </p:nvPicPr>
+        <p:blipFill>
+          <a:blip r:embed="rId5"/>
+          <a:stretch>
+            <a:fillRect/>
+          </a:stretch>
+        </p:blipFill>
+        <p:spPr>
+          <a:xfrm>
+            <a:off x="8731229" y="2977541"/>
+            <a:ext cx="459621" cy="418729"/>
+          </a:xfrm>
+          <a:prstGeom prst="rect">
+            <a:avLst/>
+          </a:prstGeom>
+        </p:spPr>
+      </p:pic>
+      <p:pic>
+        <p:nvPicPr>
+          <p:cNvPr id="33" name="Event Hubs" descr="Event Hubs">
+            <a:extLst>
+              <a:ext uri="{FF2B5EF4-FFF2-40B4-BE49-F238E27FC236}">
+                <a16:creationId xmlns:a16="http://schemas.microsoft.com/office/drawing/2014/main" id="{25C03383-35EC-4989-BF36-6330183C18E9}"/>
+              </a:ext>
+            </a:extLst>
+          </p:cNvPr>
+          <p:cNvPicPr>
+            <a:picLocks noChangeAspect="1"/>
+          </p:cNvPicPr>
+          <p:nvPr/>
+        </p:nvPicPr>
+        <p:blipFill>
+          <a:blip r:embed="rId4"/>
+          <a:stretch>
+            <a:fillRect/>
+          </a:stretch>
+        </p:blipFill>
+        <p:spPr>
+          <a:xfrm>
+            <a:off x="10008607" y="2934166"/>
+            <a:ext cx="467828" cy="492622"/>
+          </a:xfrm>
+          <a:prstGeom prst="rect">
+            <a:avLst/>
+          </a:prstGeom>
+        </p:spPr>
+      </p:pic>
+      <p:cxnSp>
+        <p:nvCxnSpPr>
+          <p:cNvPr id="35" name="直接箭头连接符 34">
+            <a:extLst>
+              <a:ext uri="{FF2B5EF4-FFF2-40B4-BE49-F238E27FC236}">
+                <a16:creationId xmlns:a16="http://schemas.microsoft.com/office/drawing/2014/main" id="{54576171-5480-4F0E-98B5-D0B583BBA875}"/>
+              </a:ext>
+            </a:extLst>
+          </p:cNvPr>
+          <p:cNvCxnSpPr>
+            <a:cxnSpLocks/>
+          </p:cNvCxnSpPr>
+          <p:nvPr/>
+        </p:nvCxnSpPr>
+        <p:spPr>
+          <a:xfrm>
+            <a:off x="8031494" y="3172074"/>
+            <a:ext cx="605961" cy="0"/>
+          </a:xfrm>
+          <a:prstGeom prst="straightConnector1">
+            <a:avLst/>
+          </a:prstGeom>
+          <a:ln w="38100">
+            <a:solidFill>
+              <a:schemeClr val="tx1"/>
+            </a:solidFill>
+            <a:headEnd type="none" w="lg" len="med"/>
+            <a:tailEnd type="triangle"/>
+          </a:ln>
+        </p:spPr>
+        <p:style>
+          <a:lnRef idx="1">
+            <a:schemeClr val="accent1"/>
+          </a:lnRef>
+          <a:fillRef idx="0">
+            <a:schemeClr val="accent1"/>
+          </a:fillRef>
+          <a:effectRef idx="0">
+            <a:schemeClr val="accent1"/>
+          </a:effectRef>
+          <a:fontRef idx="minor">
+            <a:schemeClr val="tx1"/>
+          </a:fontRef>
+        </p:style>
+      </p:cxnSp>
+      <p:cxnSp>
+        <p:nvCxnSpPr>
+          <p:cNvPr id="37" name="直接箭头连接符 36">
+            <a:extLst>
+              <a:ext uri="{FF2B5EF4-FFF2-40B4-BE49-F238E27FC236}">
+                <a16:creationId xmlns:a16="http://schemas.microsoft.com/office/drawing/2014/main" id="{7E153BB7-3085-472C-834C-2463834A57E4}"/>
+              </a:ext>
+            </a:extLst>
+          </p:cNvPr>
+          <p:cNvCxnSpPr>
+            <a:cxnSpLocks/>
+          </p:cNvCxnSpPr>
+          <p:nvPr/>
+        </p:nvCxnSpPr>
+        <p:spPr>
+          <a:xfrm>
+            <a:off x="9299872" y="3172074"/>
+            <a:ext cx="605961" cy="0"/>
+          </a:xfrm>
+          <a:prstGeom prst="straightConnector1">
+            <a:avLst/>
+          </a:prstGeom>
+          <a:ln w="38100">
+            <a:solidFill>
+              <a:schemeClr val="tx1"/>
+            </a:solidFill>
+            <a:headEnd type="none" w="lg" len="med"/>
+            <a:tailEnd type="triangle"/>
+          </a:ln>
+        </p:spPr>
+        <p:style>
+          <a:lnRef idx="1">
+            <a:schemeClr val="accent1"/>
+          </a:lnRef>
+          <a:fillRef idx="0">
+            <a:schemeClr val="accent1"/>
+          </a:fillRef>
+          <a:effectRef idx="0">
+            <a:schemeClr val="accent1"/>
+          </a:effectRef>
+          <a:fontRef idx="minor">
+            <a:schemeClr val="tx1"/>
+          </a:fontRef>
+        </p:style>
+      </p:cxnSp>
+      <p:sp>
+        <p:nvSpPr>
+          <p:cNvPr id="39" name="文本框 38">
+            <a:extLst>
+              <a:ext uri="{FF2B5EF4-FFF2-40B4-BE49-F238E27FC236}">
+                <a16:creationId xmlns:a16="http://schemas.microsoft.com/office/drawing/2014/main" id="{A0F2D28C-5B57-4A50-A8D6-BC8FA0D09D61}"/>
+              </a:ext>
+            </a:extLst>
+          </p:cNvPr>
+          <p:cNvSpPr txBox="1"/>
+          <p:nvPr/>
+        </p:nvSpPr>
+        <p:spPr>
+          <a:xfrm>
+            <a:off x="8567835" y="3543400"/>
+            <a:ext cx="1260986" cy="984885"/>
+          </a:xfrm>
+          <a:prstGeom prst="rect">
+            <a:avLst/>
+          </a:prstGeom>
+          <a:noFill/>
+        </p:spPr>
+        <p:txBody>
+          <a:bodyPr wrap="none" lIns="0" tIns="0" rIns="0" bIns="0" rtlCol="0">
+            <a:spAutoFit/>
+          </a:bodyPr>
+          <a:lstStyle/>
+          <a:p>
+            <a:pPr algn="l"/>
+            <a:r>
+              <a:rPr lang="en-US" sz="1600" dirty="0">
+                <a:gradFill>
+                  <a:gsLst>
+                    <a:gs pos="2917">
+                      <a:schemeClr val="tx1"/>
+                    </a:gs>
+                    <a:gs pos="30000">
+                      <a:schemeClr val="tx1"/>
+                    </a:gs>
+                  </a:gsLst>
+                  <a:lin ang="5400000" scaled="0"/>
+                </a:gradFill>
+              </a:rPr>
+              <a:t>Function</a:t>
+            </a:r>
+          </a:p>
+          <a:p>
+            <a:pPr algn="l"/>
+            <a:endParaRPr lang="en-US" sz="1600" dirty="0">
+              <a:gradFill>
+                <a:gsLst>
+                  <a:gs pos="2917">
+                    <a:schemeClr val="tx1"/>
+                  </a:gs>
+                  <a:gs pos="30000">
+                    <a:schemeClr val="tx1"/>
+                  </a:gs>
+                </a:gsLst>
+                <a:lin ang="5400000" scaled="0"/>
+              </a:gradFill>
+            </a:endParaRPr>
+          </a:p>
+          <a:p>
+            <a:pPr algn="l"/>
+            <a:r>
+              <a:rPr lang="en-US" altLang="zh-CN" sz="1600" dirty="0">
+                <a:gradFill>
+                  <a:gsLst>
+                    <a:gs pos="2917">
+                      <a:schemeClr val="tx1"/>
+                    </a:gs>
+                    <a:gs pos="30000">
+                      <a:schemeClr val="tx1"/>
+                    </a:gs>
+                  </a:gsLst>
+                  <a:lin ang="5400000" scaled="0"/>
+                </a:gradFill>
+              </a:rPr>
+              <a:t>ADT</a:t>
+            </a:r>
+            <a:r>
+              <a:rPr lang="en-US" altLang="zh-CN" sz="1600" dirty="0">
+                <a:gradFill>
+                  <a:gsLst>
+                    <a:gs pos="2917">
+                      <a:schemeClr val="tx1"/>
+                    </a:gs>
+                    <a:gs pos="30000">
+                      <a:schemeClr val="tx1"/>
+                    </a:gs>
+                  </a:gsLst>
+                  <a:lin ang="5400000" scaled="0"/>
+                </a:gradFill>
+                <a:sym typeface="Wingdings" panose="05000000000000000000" pitchFamily="2" charset="2"/>
+              </a:rPr>
+              <a:t>MQ</a:t>
+            </a:r>
+          </a:p>
+          <a:p>
+            <a:pPr algn="l"/>
+            <a:r>
+              <a:rPr lang="en-US" altLang="zh-CN" sz="1600" dirty="0">
+                <a:gradFill>
+                  <a:gsLst>
+                    <a:gs pos="2917">
+                      <a:schemeClr val="tx1"/>
+                    </a:gs>
+                    <a:gs pos="30000">
+                      <a:schemeClr val="tx1"/>
+                    </a:gs>
+                  </a:gsLst>
+                  <a:lin ang="5400000" scaled="0"/>
+                </a:gradFill>
+                <a:sym typeface="Wingdings" panose="05000000000000000000" pitchFamily="2" charset="2"/>
+              </a:rPr>
+              <a:t>JSON payload</a:t>
+            </a:r>
+            <a:endParaRPr lang="en-US" altLang="zh-CN" sz="1600" dirty="0">
+              <a:gradFill>
+                <a:gsLst>
+                  <a:gs pos="2917">
+                    <a:schemeClr val="tx1"/>
+                  </a:gs>
+                  <a:gs pos="30000">
+                    <a:schemeClr val="tx1"/>
+                  </a:gs>
+                </a:gsLst>
+                <a:lin ang="5400000" scaled="0"/>
+              </a:gradFill>
+            </a:endParaRPr>
+          </a:p>
+        </p:txBody>
+      </p:sp>
+      <p:cxnSp>
+        <p:nvCxnSpPr>
+          <p:cNvPr id="41" name="连接符: 肘形 40">
+            <a:extLst>
+              <a:ext uri="{FF2B5EF4-FFF2-40B4-BE49-F238E27FC236}">
+                <a16:creationId xmlns:a16="http://schemas.microsoft.com/office/drawing/2014/main" id="{47DACB1A-62BE-4EA4-BB9F-620760DE63AE}"/>
+              </a:ext>
+            </a:extLst>
+          </p:cNvPr>
+          <p:cNvCxnSpPr>
+            <a:stCxn id="33" idx="0"/>
+            <a:endCxn id="8" idx="3"/>
+          </p:cNvCxnSpPr>
+          <p:nvPr/>
+        </p:nvCxnSpPr>
+        <p:spPr>
+          <a:xfrm rot="16200000" flipV="1">
+            <a:off x="8747970" y="1439615"/>
+            <a:ext cx="1170849" cy="1818254"/>
+          </a:xfrm>
+          <a:prstGeom prst="bentConnector2">
+            <a:avLst/>
+          </a:prstGeom>
+          <a:ln w="38100">
+            <a:solidFill>
+              <a:schemeClr val="tx1"/>
+            </a:solidFill>
+            <a:headEnd type="none" w="lg" len="med"/>
+            <a:tailEnd type="triangle"/>
+          </a:ln>
+        </p:spPr>
+        <p:style>
+          <a:lnRef idx="1">
+            <a:schemeClr val="accent1"/>
+          </a:lnRef>
+          <a:fillRef idx="0">
+            <a:schemeClr val="accent1"/>
+          </a:fillRef>
+          <a:effectRef idx="0">
+            <a:schemeClr val="accent1"/>
+          </a:effectRef>
+          <a:fontRef idx="minor">
+            <a:schemeClr val="tx1"/>
+          </a:fontRef>
+        </p:style>
+      </p:cxnSp>
+      <p:cxnSp>
+        <p:nvCxnSpPr>
+          <p:cNvPr id="43" name="连接符: 肘形 42">
+            <a:extLst>
+              <a:ext uri="{FF2B5EF4-FFF2-40B4-BE49-F238E27FC236}">
+                <a16:creationId xmlns:a16="http://schemas.microsoft.com/office/drawing/2014/main" id="{C25986EB-BAD1-4987-877B-79D1702992F0}"/>
+              </a:ext>
+            </a:extLst>
+          </p:cNvPr>
+          <p:cNvCxnSpPr>
+            <a:cxnSpLocks/>
+            <a:stCxn id="8" idx="1"/>
+            <a:endCxn id="4" idx="0"/>
+          </p:cNvCxnSpPr>
+          <p:nvPr/>
+        </p:nvCxnSpPr>
+        <p:spPr>
+          <a:xfrm rot="10800000" flipV="1">
+            <a:off x="5981368" y="1763316"/>
+            <a:ext cx="1983278" cy="924757"/>
+          </a:xfrm>
+          <a:prstGeom prst="bentConnector2">
+            <a:avLst/>
+          </a:prstGeom>
+          <a:ln w="38100">
+            <a:solidFill>
+              <a:schemeClr val="tx1"/>
+            </a:solidFill>
+            <a:headEnd type="none" w="lg" len="med"/>
+            <a:tailEnd type="triangle"/>
+          </a:ln>
+        </p:spPr>
+        <p:style>
+          <a:lnRef idx="1">
+            <a:schemeClr val="accent1"/>
+          </a:lnRef>
+          <a:fillRef idx="0">
+            <a:schemeClr val="accent1"/>
+          </a:fillRef>
+          <a:effectRef idx="0">
+            <a:schemeClr val="accent1"/>
+          </a:effectRef>
+          <a:fontRef idx="minor">
+            <a:schemeClr val="tx1"/>
+          </a:fontRef>
+        </p:style>
+      </p:cxnSp>
+      <p:sp>
+        <p:nvSpPr>
+          <p:cNvPr id="47" name="文本框 46">
+            <a:extLst>
+              <a:ext uri="{FF2B5EF4-FFF2-40B4-BE49-F238E27FC236}">
+                <a16:creationId xmlns:a16="http://schemas.microsoft.com/office/drawing/2014/main" id="{BE2AC3C4-D714-41C6-9E66-ED7DC42ED78E}"/>
+              </a:ext>
+            </a:extLst>
+          </p:cNvPr>
+          <p:cNvSpPr txBox="1"/>
+          <p:nvPr/>
+        </p:nvSpPr>
+        <p:spPr>
+          <a:xfrm>
+            <a:off x="9901027" y="3505841"/>
+            <a:ext cx="930126" cy="492443"/>
+          </a:xfrm>
+          <a:prstGeom prst="rect">
+            <a:avLst/>
+          </a:prstGeom>
+          <a:noFill/>
+        </p:spPr>
+        <p:txBody>
+          <a:bodyPr wrap="none" lIns="0" tIns="0" rIns="0" bIns="0" rtlCol="0">
+            <a:spAutoFit/>
+          </a:bodyPr>
+          <a:lstStyle/>
+          <a:p>
+            <a:pPr algn="l"/>
+            <a:r>
+              <a:rPr lang="en-US" sz="1600" dirty="0">
+                <a:gradFill>
+                  <a:gsLst>
+                    <a:gs pos="2917">
+                      <a:schemeClr val="tx1"/>
+                    </a:gs>
+                    <a:gs pos="30000">
+                      <a:schemeClr val="tx1"/>
+                    </a:gs>
+                  </a:gsLst>
+                  <a:lin ang="5400000" scaled="0"/>
+                </a:gradFill>
+              </a:rPr>
+              <a:t>Event Hub</a:t>
+            </a:r>
+          </a:p>
+          <a:p>
+            <a:pPr algn="l"/>
+            <a:endParaRPr lang="en-US" sz="1600" dirty="0">
+              <a:gradFill>
+                <a:gsLst>
+                  <a:gs pos="2917">
+                    <a:schemeClr val="tx1"/>
+                  </a:gs>
+                  <a:gs pos="30000">
+                    <a:schemeClr val="tx1"/>
+                  </a:gs>
+                </a:gsLst>
+                <a:lin ang="5400000" scaled="0"/>
+              </a:gradFill>
+            </a:endParaRPr>
+          </a:p>
+        </p:txBody>
+      </p:sp>
+      <p:sp>
+        <p:nvSpPr>
+          <p:cNvPr id="51" name="文本框 50">
+            <a:extLst>
+              <a:ext uri="{FF2B5EF4-FFF2-40B4-BE49-F238E27FC236}">
+                <a16:creationId xmlns:a16="http://schemas.microsoft.com/office/drawing/2014/main" id="{5CB2FFFA-A361-42B9-8088-793DDF79F62C}"/>
+              </a:ext>
+            </a:extLst>
+          </p:cNvPr>
+          <p:cNvSpPr txBox="1"/>
+          <p:nvPr/>
+        </p:nvSpPr>
+        <p:spPr>
+          <a:xfrm>
+            <a:off x="8378780" y="1919091"/>
+            <a:ext cx="1126783" cy="492443"/>
+          </a:xfrm>
+          <a:prstGeom prst="rect">
+            <a:avLst/>
+          </a:prstGeom>
+          <a:noFill/>
+        </p:spPr>
+        <p:txBody>
+          <a:bodyPr wrap="none" lIns="0" tIns="0" rIns="0" bIns="0" rtlCol="0">
+            <a:spAutoFit/>
+          </a:bodyPr>
+          <a:lstStyle/>
+          <a:p>
+            <a:pPr algn="l"/>
+            <a:r>
+              <a:rPr lang="en-US" sz="1600" dirty="0">
+                <a:gradFill>
+                  <a:gsLst>
+                    <a:gs pos="2917">
+                      <a:schemeClr val="tx1"/>
+                    </a:gs>
+                    <a:gs pos="30000">
+                      <a:schemeClr val="tx1"/>
+                    </a:gs>
+                  </a:gsLst>
+                  <a:lin ang="5400000" scaled="0"/>
+                </a:gradFill>
+              </a:rPr>
+              <a:t>Function</a:t>
+            </a:r>
+          </a:p>
+          <a:p>
+            <a:pPr algn="l"/>
+            <a:r>
+              <a:rPr lang="en-US" sz="1600" dirty="0">
+                <a:gradFill>
+                  <a:gsLst>
+                    <a:gs pos="2917">
+                      <a:schemeClr val="tx1"/>
+                    </a:gs>
+                    <a:gs pos="30000">
+                      <a:schemeClr val="tx1"/>
+                    </a:gs>
+                  </a:gsLst>
+                  <a:lin ang="5400000" scaled="0"/>
+                </a:gradFill>
+              </a:rPr>
+              <a:t>Twin Update</a:t>
+            </a:r>
+          </a:p>
+        </p:txBody>
+      </p:sp>
+      <p:cxnSp>
+        <p:nvCxnSpPr>
+          <p:cNvPr id="53" name="直接箭头连接符 52">
+            <a:extLst>
+              <a:ext uri="{FF2B5EF4-FFF2-40B4-BE49-F238E27FC236}">
+                <a16:creationId xmlns:a16="http://schemas.microsoft.com/office/drawing/2014/main" id="{080A0039-A5E3-4419-8525-5678637734E9}"/>
+              </a:ext>
+            </a:extLst>
+          </p:cNvPr>
+          <p:cNvCxnSpPr>
+            <a:cxnSpLocks/>
+          </p:cNvCxnSpPr>
+          <p:nvPr/>
+        </p:nvCxnSpPr>
+        <p:spPr>
+          <a:xfrm>
+            <a:off x="10582423" y="3172074"/>
+            <a:ext cx="605961" cy="0"/>
+          </a:xfrm>
+          <a:prstGeom prst="straightConnector1">
+            <a:avLst/>
+          </a:prstGeom>
+          <a:ln w="38100">
+            <a:solidFill>
+              <a:schemeClr val="tx1"/>
+            </a:solidFill>
+            <a:headEnd type="none" w="lg" len="med"/>
+            <a:tailEnd type="triangle"/>
+          </a:ln>
+        </p:spPr>
+        <p:style>
+          <a:lnRef idx="1">
+            <a:schemeClr val="accent1"/>
+          </a:lnRef>
+          <a:fillRef idx="0">
+            <a:schemeClr val="accent1"/>
+          </a:fillRef>
+          <a:effectRef idx="0">
+            <a:schemeClr val="accent1"/>
+          </a:effectRef>
+          <a:fontRef idx="minor">
+            <a:schemeClr val="tx1"/>
+          </a:fontRef>
+        </p:style>
+      </p:cxnSp>
+      <p:sp>
+        <p:nvSpPr>
+          <p:cNvPr id="55" name="FAzure Time Series Insights">
+            <a:extLst>
+              <a:ext uri="{FF2B5EF4-FFF2-40B4-BE49-F238E27FC236}">
+                <a16:creationId xmlns:a16="http://schemas.microsoft.com/office/drawing/2014/main" id="{3B5D0C32-B22A-40B1-9DE1-01E55EB5876D}"/>
+              </a:ext>
+            </a:extLst>
+          </p:cNvPr>
+          <p:cNvSpPr>
+            <a:spLocks noChangeAspect="1"/>
+          </p:cNvSpPr>
+          <p:nvPr/>
+        </p:nvSpPr>
+        <p:spPr bwMode="auto">
+          <a:xfrm>
+            <a:off x="11438820" y="2911925"/>
+            <a:ext cx="492443" cy="492443"/>
+          </a:xfrm>
+          <a:custGeom>
+            <a:avLst/>
+            <a:gdLst>
+              <a:gd name="connsiteX0" fmla="*/ 14723 w 956119"/>
+              <a:gd name="connsiteY0" fmla="*/ 629519 h 974006"/>
+              <a:gd name="connsiteX1" fmla="*/ 125273 w 956119"/>
+              <a:gd name="connsiteY1" fmla="*/ 629519 h 974006"/>
+              <a:gd name="connsiteX2" fmla="*/ 127061 w 956119"/>
+              <a:gd name="connsiteY2" fmla="*/ 635280 h 974006"/>
+              <a:gd name="connsiteX3" fmla="*/ 478059 w 956119"/>
+              <a:gd name="connsiteY3" fmla="*/ 867937 h 974006"/>
+              <a:gd name="connsiteX4" fmla="*/ 829058 w 956119"/>
+              <a:gd name="connsiteY4" fmla="*/ 635280 h 974006"/>
+              <a:gd name="connsiteX5" fmla="*/ 830846 w 956119"/>
+              <a:gd name="connsiteY5" fmla="*/ 629519 h 974006"/>
+              <a:gd name="connsiteX6" fmla="*/ 941395 w 956119"/>
+              <a:gd name="connsiteY6" fmla="*/ 629519 h 974006"/>
+              <a:gd name="connsiteX7" fmla="*/ 926791 w 956119"/>
+              <a:gd name="connsiteY7" fmla="*/ 676567 h 974006"/>
+              <a:gd name="connsiteX8" fmla="*/ 478059 w 956119"/>
+              <a:gd name="connsiteY8" fmla="*/ 974006 h 974006"/>
+              <a:gd name="connsiteX9" fmla="*/ 29327 w 956119"/>
+              <a:gd name="connsiteY9" fmla="*/ 676567 h 974006"/>
+              <a:gd name="connsiteX10" fmla="*/ 431843 w 956119"/>
+              <a:gd name="connsiteY10" fmla="*/ 265936 h 974006"/>
+              <a:gd name="connsiteX11" fmla="*/ 512292 w 956119"/>
+              <a:gd name="connsiteY11" fmla="*/ 476939 h 974006"/>
+              <a:gd name="connsiteX12" fmla="*/ 514638 w 956119"/>
+              <a:gd name="connsiteY12" fmla="*/ 476939 h 974006"/>
+              <a:gd name="connsiteX13" fmla="*/ 550380 w 956119"/>
+              <a:gd name="connsiteY13" fmla="*/ 570988 h 974006"/>
+              <a:gd name="connsiteX14" fmla="*/ 605703 w 956119"/>
+              <a:gd name="connsiteY14" fmla="*/ 476939 h 974006"/>
+              <a:gd name="connsiteX15" fmla="*/ 698149 w 956119"/>
+              <a:gd name="connsiteY15" fmla="*/ 476939 h 974006"/>
+              <a:gd name="connsiteX16" fmla="*/ 698147 w 956119"/>
+              <a:gd name="connsiteY16" fmla="*/ 476942 h 974006"/>
+              <a:gd name="connsiteX17" fmla="*/ 906152 w 956119"/>
+              <a:gd name="connsiteY17" fmla="*/ 476942 h 974006"/>
+              <a:gd name="connsiteX18" fmla="*/ 946652 w 956119"/>
+              <a:gd name="connsiteY18" fmla="*/ 517442 h 974006"/>
+              <a:gd name="connsiteX19" fmla="*/ 946651 w 956119"/>
+              <a:gd name="connsiteY19" fmla="*/ 517442 h 974006"/>
+              <a:gd name="connsiteX20" fmla="*/ 906151 w 956119"/>
+              <a:gd name="connsiteY20" fmla="*/ 557942 h 974006"/>
+              <a:gd name="connsiteX21" fmla="*/ 645070 w 956119"/>
+              <a:gd name="connsiteY21" fmla="*/ 557942 h 974006"/>
+              <a:gd name="connsiteX22" fmla="*/ 521319 w 956119"/>
+              <a:gd name="connsiteY22" fmla="*/ 746796 h 974006"/>
+              <a:gd name="connsiteX23" fmla="*/ 514386 w 956119"/>
+              <a:gd name="connsiteY23" fmla="*/ 727687 h 974006"/>
+              <a:gd name="connsiteX24" fmla="*/ 419220 w 956119"/>
+              <a:gd name="connsiteY24" fmla="*/ 426015 h 974006"/>
+              <a:gd name="connsiteX25" fmla="*/ 354803 w 956119"/>
+              <a:gd name="connsiteY25" fmla="*/ 557942 h 974006"/>
+              <a:gd name="connsiteX26" fmla="*/ 270770 w 956119"/>
+              <a:gd name="connsiteY26" fmla="*/ 557942 h 974006"/>
+              <a:gd name="connsiteX27" fmla="*/ 45129 w 956119"/>
+              <a:gd name="connsiteY27" fmla="*/ 557941 h 974006"/>
+              <a:gd name="connsiteX28" fmla="*/ 16491 w 956119"/>
+              <a:gd name="connsiteY28" fmla="*/ 546079 h 974006"/>
+              <a:gd name="connsiteX29" fmla="*/ 4629 w 956119"/>
+              <a:gd name="connsiteY29" fmla="*/ 517442 h 974006"/>
+              <a:gd name="connsiteX30" fmla="*/ 16491 w 956119"/>
+              <a:gd name="connsiteY30" fmla="*/ 488804 h 974006"/>
+              <a:gd name="connsiteX31" fmla="*/ 45129 w 956119"/>
+              <a:gd name="connsiteY31" fmla="*/ 476942 h 974006"/>
+              <a:gd name="connsiteX32" fmla="*/ 315450 w 956119"/>
+              <a:gd name="connsiteY32" fmla="*/ 476942 h 974006"/>
+              <a:gd name="connsiteX33" fmla="*/ 478059 w 956119"/>
+              <a:gd name="connsiteY33" fmla="*/ 0 h 974006"/>
+              <a:gd name="connsiteX34" fmla="*/ 955168 w 956119"/>
+              <a:gd name="connsiteY34" fmla="*/ 388855 h 974006"/>
+              <a:gd name="connsiteX35" fmla="*/ 956119 w 956119"/>
+              <a:gd name="connsiteY35" fmla="*/ 398283 h 974006"/>
+              <a:gd name="connsiteX36" fmla="*/ 847545 w 956119"/>
+              <a:gd name="connsiteY36" fmla="*/ 398283 h 974006"/>
+              <a:gd name="connsiteX37" fmla="*/ 829058 w 956119"/>
+              <a:gd name="connsiteY37" fmla="*/ 338727 h 974006"/>
+              <a:gd name="connsiteX38" fmla="*/ 478059 w 956119"/>
+              <a:gd name="connsiteY38" fmla="*/ 106069 h 974006"/>
+              <a:gd name="connsiteX39" fmla="*/ 127061 w 956119"/>
+              <a:gd name="connsiteY39" fmla="*/ 338727 h 974006"/>
+              <a:gd name="connsiteX40" fmla="*/ 108574 w 956119"/>
+              <a:gd name="connsiteY40" fmla="*/ 398283 h 974006"/>
+              <a:gd name="connsiteX41" fmla="*/ 0 w 956119"/>
+              <a:gd name="connsiteY41" fmla="*/ 398283 h 974006"/>
+              <a:gd name="connsiteX42" fmla="*/ 950 w 956119"/>
+              <a:gd name="connsiteY42" fmla="*/ 388855 h 974006"/>
+              <a:gd name="connsiteX43" fmla="*/ 478059 w 956119"/>
+              <a:gd name="connsiteY43" fmla="*/ 0 h 974006"/>
+            </a:gdLst>
+            <a:ahLst/>
+            <a:cxnLst>
+              <a:cxn ang="0">
+                <a:pos x="connsiteX0" y="connsiteY0"/>
+              </a:cxn>
+              <a:cxn ang="0">
+                <a:pos x="connsiteX1" y="connsiteY1"/>
+              </a:cxn>
+              <a:cxn ang="0">
+                <a:pos x="connsiteX2" y="connsiteY2"/>
+              </a:cxn>
+              <a:cxn ang="0">
+                <a:pos x="connsiteX3" y="connsiteY3"/>
+              </a:cxn>
+              <a:cxn ang="0">
+                <a:pos x="connsiteX4" y="connsiteY4"/>
+              </a:cxn>
+              <a:cxn ang="0">
+                <a:pos x="connsiteX5" y="connsiteY5"/>
+              </a:cxn>
+              <a:cxn ang="0">
+                <a:pos x="connsiteX6" y="connsiteY6"/>
+              </a:cxn>
+              <a:cxn ang="0">
+                <a:pos x="connsiteX7" y="connsiteY7"/>
+              </a:cxn>
+              <a:cxn ang="0">
+                <a:pos x="connsiteX8" y="connsiteY8"/>
+              </a:cxn>
+              <a:cxn ang="0">
+                <a:pos x="connsiteX9" y="connsiteY9"/>
+              </a:cxn>
+              <a:cxn ang="0">
+                <a:pos x="connsiteX10" y="connsiteY10"/>
+              </a:cxn>
+              <a:cxn ang="0">
+                <a:pos x="connsiteX11" y="connsiteY11"/>
+              </a:cxn>
+              <a:cxn ang="0">
+                <a:pos x="connsiteX12" y="connsiteY12"/>
+              </a:cxn>
+              <a:cxn ang="0">
+                <a:pos x="connsiteX13" y="connsiteY13"/>
+              </a:cxn>
+              <a:cxn ang="0">
+                <a:pos x="connsiteX14" y="connsiteY14"/>
+              </a:cxn>
+              <a:cxn ang="0">
+                <a:pos x="connsiteX15" y="connsiteY15"/>
+              </a:cxn>
+              <a:cxn ang="0">
+                <a:pos x="connsiteX16" y="connsiteY16"/>
+              </a:cxn>
+              <a:cxn ang="0">
+                <a:pos x="connsiteX17" y="connsiteY17"/>
+              </a:cxn>
+              <a:cxn ang="0">
+                <a:pos x="connsiteX18" y="connsiteY18"/>
+              </a:cxn>
+              <a:cxn ang="0">
+                <a:pos x="connsiteX19" y="connsiteY19"/>
+              </a:cxn>
+              <a:cxn ang="0">
+                <a:pos x="connsiteX20" y="connsiteY20"/>
+              </a:cxn>
+              <a:cxn ang="0">
+                <a:pos x="connsiteX21" y="connsiteY21"/>
+              </a:cxn>
+              <a:cxn ang="0">
+                <a:pos x="connsiteX22" y="connsiteY22"/>
+              </a:cxn>
+              <a:cxn ang="0">
+                <a:pos x="connsiteX23" y="connsiteY23"/>
+              </a:cxn>
+              <a:cxn ang="0">
+                <a:pos x="connsiteX24" y="connsiteY24"/>
+              </a:cxn>
+              <a:cxn ang="0">
+                <a:pos x="connsiteX25" y="connsiteY25"/>
+              </a:cxn>
+              <a:cxn ang="0">
+                <a:pos x="connsiteX26" y="connsiteY26"/>
+              </a:cxn>
+              <a:cxn ang="0">
+                <a:pos x="connsiteX27" y="connsiteY27"/>
+              </a:cxn>
+              <a:cxn ang="0">
+                <a:pos x="connsiteX28" y="connsiteY28"/>
+              </a:cxn>
+              <a:cxn ang="0">
+                <a:pos x="connsiteX29" y="connsiteY29"/>
+              </a:cxn>
+              <a:cxn ang="0">
+                <a:pos x="connsiteX30" y="connsiteY30"/>
+              </a:cxn>
+              <a:cxn ang="0">
+                <a:pos x="connsiteX31" y="connsiteY31"/>
+              </a:cxn>
+              <a:cxn ang="0">
+                <a:pos x="connsiteX32" y="connsiteY32"/>
+              </a:cxn>
+              <a:cxn ang="0">
+                <a:pos x="connsiteX33" y="connsiteY33"/>
+              </a:cxn>
+              <a:cxn ang="0">
+                <a:pos x="connsiteX34" y="connsiteY34"/>
+              </a:cxn>
+              <a:cxn ang="0">
+                <a:pos x="connsiteX35" y="connsiteY35"/>
+              </a:cxn>
+              <a:cxn ang="0">
+                <a:pos x="connsiteX36" y="connsiteY36"/>
+              </a:cxn>
+              <a:cxn ang="0">
+                <a:pos x="connsiteX37" y="connsiteY37"/>
+              </a:cxn>
+              <a:cxn ang="0">
+                <a:pos x="connsiteX38" y="connsiteY38"/>
+              </a:cxn>
+              <a:cxn ang="0">
+                <a:pos x="connsiteX39" y="connsiteY39"/>
+              </a:cxn>
+              <a:cxn ang="0">
+                <a:pos x="connsiteX40" y="connsiteY40"/>
+              </a:cxn>
+              <a:cxn ang="0">
+                <a:pos x="connsiteX41" y="connsiteY41"/>
+              </a:cxn>
+              <a:cxn ang="0">
+                <a:pos x="connsiteX42" y="connsiteY42"/>
+              </a:cxn>
+              <a:cxn ang="0">
+                <a:pos x="connsiteX43" y="connsiteY43"/>
+              </a:cxn>
+            </a:cxnLst>
+            <a:rect l="l" t="t" r="r" b="b"/>
+            <a:pathLst>
+              <a:path w="956119" h="974006">
+                <a:moveTo>
+                  <a:pt x="14723" y="629519"/>
+                </a:moveTo>
+                <a:lnTo>
+                  <a:pt x="125273" y="629519"/>
+                </a:lnTo>
+                <a:lnTo>
+                  <a:pt x="127061" y="635280"/>
+                </a:lnTo>
+                <a:cubicBezTo>
+                  <a:pt x="184890" y="772003"/>
+                  <a:pt x="320271" y="867937"/>
+                  <a:pt x="478059" y="867937"/>
+                </a:cubicBezTo>
+                <a:cubicBezTo>
+                  <a:pt x="635847" y="867937"/>
+                  <a:pt x="771229" y="772003"/>
+                  <a:pt x="829058" y="635280"/>
+                </a:cubicBezTo>
+                <a:lnTo>
+                  <a:pt x="830846" y="629519"/>
+                </a:lnTo>
+                <a:lnTo>
+                  <a:pt x="941395" y="629519"/>
+                </a:lnTo>
+                <a:lnTo>
+                  <a:pt x="926791" y="676567"/>
+                </a:lnTo>
+                <a:cubicBezTo>
+                  <a:pt x="852860" y="851359"/>
+                  <a:pt x="679782" y="974006"/>
+                  <a:pt x="478059" y="974006"/>
+                </a:cubicBezTo>
+                <a:cubicBezTo>
+                  <a:pt x="276336" y="974006"/>
+                  <a:pt x="103259" y="851359"/>
+                  <a:pt x="29327" y="676567"/>
+                </a:cubicBezTo>
+                <a:close/>
+                <a:moveTo>
+                  <a:pt x="431843" y="265936"/>
+                </a:moveTo>
+                <a:lnTo>
+                  <a:pt x="512292" y="476939"/>
+                </a:lnTo>
+                <a:lnTo>
+                  <a:pt x="514638" y="476939"/>
+                </a:lnTo>
+                <a:lnTo>
+                  <a:pt x="550380" y="570988"/>
+                </a:lnTo>
+                <a:lnTo>
+                  <a:pt x="605703" y="476939"/>
+                </a:lnTo>
+                <a:lnTo>
+                  <a:pt x="698149" y="476939"/>
+                </a:lnTo>
+                <a:lnTo>
+                  <a:pt x="698147" y="476942"/>
+                </a:lnTo>
+                <a:lnTo>
+                  <a:pt x="906152" y="476942"/>
+                </a:lnTo>
+                <a:cubicBezTo>
+                  <a:pt x="928520" y="476942"/>
+                  <a:pt x="946652" y="495074"/>
+                  <a:pt x="946652" y="517442"/>
+                </a:cubicBezTo>
+                <a:lnTo>
+                  <a:pt x="946651" y="517442"/>
+                </a:lnTo>
+                <a:cubicBezTo>
+                  <a:pt x="946651" y="539810"/>
+                  <a:pt x="928519" y="557942"/>
+                  <a:pt x="906151" y="557942"/>
+                </a:cubicBezTo>
+                <a:lnTo>
+                  <a:pt x="645070" y="557942"/>
+                </a:lnTo>
+                <a:lnTo>
+                  <a:pt x="521319" y="746796"/>
+                </a:lnTo>
+                <a:lnTo>
+                  <a:pt x="514386" y="727687"/>
+                </a:lnTo>
+                <a:lnTo>
+                  <a:pt x="419220" y="426015"/>
+                </a:lnTo>
+                <a:lnTo>
+                  <a:pt x="354803" y="557942"/>
+                </a:lnTo>
+                <a:lnTo>
+                  <a:pt x="270770" y="557942"/>
+                </a:lnTo>
+                <a:lnTo>
+                  <a:pt x="45129" y="557941"/>
+                </a:lnTo>
+                <a:cubicBezTo>
+                  <a:pt x="33945" y="557941"/>
+                  <a:pt x="23820" y="553408"/>
+                  <a:pt x="16491" y="546079"/>
+                </a:cubicBezTo>
+                <a:lnTo>
+                  <a:pt x="4629" y="517442"/>
+                </a:lnTo>
+                <a:lnTo>
+                  <a:pt x="16491" y="488804"/>
+                </a:lnTo>
+                <a:cubicBezTo>
+                  <a:pt x="23820" y="481475"/>
+                  <a:pt x="33945" y="476942"/>
+                  <a:pt x="45129" y="476942"/>
+                </a:cubicBezTo>
+                <a:lnTo>
+                  <a:pt x="315450" y="476942"/>
+                </a:lnTo>
+                <a:close/>
+                <a:moveTo>
+                  <a:pt x="478059" y="0"/>
+                </a:moveTo>
+                <a:cubicBezTo>
+                  <a:pt x="713403" y="0"/>
+                  <a:pt x="909757" y="166936"/>
+                  <a:pt x="955168" y="388855"/>
+                </a:cubicBezTo>
+                <a:lnTo>
+                  <a:pt x="956119" y="398283"/>
+                </a:lnTo>
+                <a:lnTo>
+                  <a:pt x="847545" y="398283"/>
+                </a:lnTo>
+                <a:lnTo>
+                  <a:pt x="829058" y="338727"/>
+                </a:lnTo>
+                <a:cubicBezTo>
+                  <a:pt x="771229" y="202004"/>
+                  <a:pt x="635847" y="106069"/>
+                  <a:pt x="478059" y="106069"/>
+                </a:cubicBezTo>
+                <a:cubicBezTo>
+                  <a:pt x="320271" y="106069"/>
+                  <a:pt x="184890" y="202004"/>
+                  <a:pt x="127061" y="338727"/>
+                </a:cubicBezTo>
+                <a:lnTo>
+                  <a:pt x="108574" y="398283"/>
+                </a:lnTo>
+                <a:lnTo>
+                  <a:pt x="0" y="398283"/>
+                </a:lnTo>
+                <a:lnTo>
+                  <a:pt x="950" y="388855"/>
+                </a:lnTo>
+                <a:cubicBezTo>
+                  <a:pt x="46362" y="166936"/>
+                  <a:pt x="242716" y="0"/>
+                  <a:pt x="478059" y="0"/>
+                </a:cubicBezTo>
+                <a:close/>
+              </a:path>
+            </a:pathLst>
+          </a:custGeom>
+          <a:solidFill>
+            <a:srgbClr val="00B050"/>
+          </a:solidFill>
+          <a:ln w="9525" cap="flat" cmpd="sng" algn="ctr">
+            <a:noFill/>
+            <a:prstDash val="solid"/>
+            <a:headEnd type="none" w="med" len="med"/>
+            <a:tailEnd type="none" w="med" len="med"/>
+          </a:ln>
+          <a:effectLst/>
+        </p:spPr>
+        <p:txBody>
+          <a:bodyPr rot="0" spcFirstLastPara="0" vertOverflow="overflow" horzOverflow="overflow" vert="horz" wrap="square" lIns="182880" tIns="146304" rIns="182880" bIns="146304" numCol="1" spcCol="0" rtlCol="0" fromWordArt="0" anchor="t" anchorCtr="0" forceAA="0" compatLnSpc="1">
+            <a:prstTxWarp prst="textNoShape">
+              <a:avLst/>
+            </a:prstTxWarp>
+            <a:noAutofit/>
+          </a:bodyPr>
+          <a:lstStyle/>
+          <a:p>
+            <a:pPr marL="0" marR="0" lvl="0" indent="0" algn="ctr" defTabSz="932472" rtl="0" eaLnBrk="1" fontAlgn="base" latinLnBrk="0" hangingPunct="1">
+              <a:lnSpc>
+                <a:spcPct val="90000"/>
+              </a:lnSpc>
+              <a:spcBef>
+                <a:spcPct val="0"/>
+              </a:spcBef>
+              <a:spcAft>
+                <a:spcPct val="0"/>
+              </a:spcAft>
+              <a:buClrTx/>
+              <a:buSzTx/>
+              <a:buFontTx/>
+              <a:buNone/>
+              <a:tabLst/>
+              <a:defRPr/>
+            </a:pPr>
+            <a:endParaRPr kumimoji="0" lang="en-US" sz="500" b="0" i="0" u="none" strike="noStrike" kern="0" cap="none" spc="0" normalizeH="0" baseline="0" noProof="0" dirty="0">
+              <a:ln>
+                <a:noFill/>
+              </a:ln>
+              <a:gradFill>
+                <a:gsLst>
+                  <a:gs pos="0">
+                    <a:srgbClr val="FFFFFF"/>
+                  </a:gs>
+                  <a:gs pos="100000">
+                    <a:srgbClr val="FFFFFF"/>
+                  </a:gs>
+                </a:gsLst>
+                <a:lin ang="5400000" scaled="0"/>
+              </a:gradFill>
+              <a:effectLst/>
+              <a:uLnTx/>
+              <a:uFillTx/>
+              <a:latin typeface="Segoe UI"/>
+              <a:ea typeface="Segoe UI" pitchFamily="34" charset="0"/>
+              <a:cs typeface="Segoe UI" pitchFamily="34" charset="0"/>
+            </a:endParaRPr>
+          </a:p>
+        </p:txBody>
+      </p:sp>
+    </p:spTree>
+    <p:extLst>
+      <p:ext uri="{BB962C8B-B14F-4D97-AF65-F5344CB8AC3E}">
+        <p14:creationId xmlns:p14="http://schemas.microsoft.com/office/powerpoint/2010/main" val="1143279891"/>
       </p:ext>
     </p:extLst>
   </p:cSld>

</xml_diff>